<commit_message>
added project base structure + prerequisites
</commit_message>
<xml_diff>
--- a/Backlog/Demo 1.pptx
+++ b/Backlog/Demo 1.pptx
@@ -629,7 +629,7 @@
           <a:p>
             <a:fld id="{1EC6663A-CE1B-480C-ABFA-A1C2E4D1AD37}" type="datetimeFigureOut">
               <a:rPr lang="ro-RO" smtClean="0"/>
-              <a:t>05.12.2017</a:t>
+              <a:t>06.12.2017</a:t>
             </a:fld>
             <a:endParaRPr lang="ro-RO"/>
           </a:p>
@@ -925,7 +925,7 @@
           <a:p>
             <a:fld id="{1EC6663A-CE1B-480C-ABFA-A1C2E4D1AD37}" type="datetimeFigureOut">
               <a:rPr lang="ro-RO" smtClean="0"/>
-              <a:t>05.12.2017</a:t>
+              <a:t>06.12.2017</a:t>
             </a:fld>
             <a:endParaRPr lang="ro-RO"/>
           </a:p>
@@ -1173,7 +1173,7 @@
           <a:p>
             <a:fld id="{1EC6663A-CE1B-480C-ABFA-A1C2E4D1AD37}" type="datetimeFigureOut">
               <a:rPr lang="ro-RO" smtClean="0"/>
-              <a:t>05.12.2017</a:t>
+              <a:t>06.12.2017</a:t>
             </a:fld>
             <a:endParaRPr lang="ro-RO"/>
           </a:p>
@@ -1713,7 +1713,7 @@
           <a:p>
             <a:fld id="{1EC6663A-CE1B-480C-ABFA-A1C2E4D1AD37}" type="datetimeFigureOut">
               <a:rPr lang="ro-RO" smtClean="0"/>
-              <a:t>05.12.2017</a:t>
+              <a:t>06.12.2017</a:t>
             </a:fld>
             <a:endParaRPr lang="ro-RO"/>
           </a:p>
@@ -1961,7 +1961,7 @@
           <a:p>
             <a:fld id="{1EC6663A-CE1B-480C-ABFA-A1C2E4D1AD37}" type="datetimeFigureOut">
               <a:rPr lang="ro-RO" smtClean="0"/>
-              <a:t>05.12.2017</a:t>
+              <a:t>06.12.2017</a:t>
             </a:fld>
             <a:endParaRPr lang="ro-RO"/>
           </a:p>
@@ -2493,7 +2493,7 @@
           <a:p>
             <a:fld id="{1EC6663A-CE1B-480C-ABFA-A1C2E4D1AD37}" type="datetimeFigureOut">
               <a:rPr lang="ro-RO" smtClean="0"/>
-              <a:t>05.12.2017</a:t>
+              <a:t>06.12.2017</a:t>
             </a:fld>
             <a:endParaRPr lang="ro-RO"/>
           </a:p>
@@ -2790,7 +2790,7 @@
           <a:p>
             <a:fld id="{1EC6663A-CE1B-480C-ABFA-A1C2E4D1AD37}" type="datetimeFigureOut">
               <a:rPr lang="ro-RO" smtClean="0"/>
-              <a:t>05.12.2017</a:t>
+              <a:t>06.12.2017</a:t>
             </a:fld>
             <a:endParaRPr lang="ro-RO"/>
           </a:p>
@@ -2964,7 +2964,7 @@
           <a:p>
             <a:fld id="{1EC6663A-CE1B-480C-ABFA-A1C2E4D1AD37}" type="datetimeFigureOut">
               <a:rPr lang="ro-RO" smtClean="0"/>
-              <a:t>05.12.2017</a:t>
+              <a:t>06.12.2017</a:t>
             </a:fld>
             <a:endParaRPr lang="ro-RO"/>
           </a:p>
@@ -3144,7 +3144,7 @@
           <a:p>
             <a:fld id="{1EC6663A-CE1B-480C-ABFA-A1C2E4D1AD37}" type="datetimeFigureOut">
               <a:rPr lang="ro-RO" smtClean="0"/>
-              <a:t>05.12.2017</a:t>
+              <a:t>06.12.2017</a:t>
             </a:fld>
             <a:endParaRPr lang="ro-RO"/>
           </a:p>
@@ -3314,7 +3314,7 @@
           <a:p>
             <a:fld id="{1EC6663A-CE1B-480C-ABFA-A1C2E4D1AD37}" type="datetimeFigureOut">
               <a:rPr lang="ro-RO" smtClean="0"/>
-              <a:t>05.12.2017</a:t>
+              <a:t>06.12.2017</a:t>
             </a:fld>
             <a:endParaRPr lang="ro-RO"/>
           </a:p>
@@ -3565,7 +3565,7 @@
           <a:p>
             <a:fld id="{1EC6663A-CE1B-480C-ABFA-A1C2E4D1AD37}" type="datetimeFigureOut">
               <a:rPr lang="ro-RO" smtClean="0"/>
-              <a:t>05.12.2017</a:t>
+              <a:t>06.12.2017</a:t>
             </a:fld>
             <a:endParaRPr lang="ro-RO"/>
           </a:p>
@@ -3862,7 +3862,7 @@
           <a:p>
             <a:fld id="{1EC6663A-CE1B-480C-ABFA-A1C2E4D1AD37}" type="datetimeFigureOut">
               <a:rPr lang="ro-RO" smtClean="0"/>
-              <a:t>05.12.2017</a:t>
+              <a:t>06.12.2017</a:t>
             </a:fld>
             <a:endParaRPr lang="ro-RO"/>
           </a:p>
@@ -4304,7 +4304,7 @@
           <a:p>
             <a:fld id="{1EC6663A-CE1B-480C-ABFA-A1C2E4D1AD37}" type="datetimeFigureOut">
               <a:rPr lang="ro-RO" smtClean="0"/>
-              <a:t>05.12.2017</a:t>
+              <a:t>06.12.2017</a:t>
             </a:fld>
             <a:endParaRPr lang="ro-RO"/>
           </a:p>
@@ -4422,7 +4422,7 @@
           <a:p>
             <a:fld id="{1EC6663A-CE1B-480C-ABFA-A1C2E4D1AD37}" type="datetimeFigureOut">
               <a:rPr lang="ro-RO" smtClean="0"/>
-              <a:t>05.12.2017</a:t>
+              <a:t>06.12.2017</a:t>
             </a:fld>
             <a:endParaRPr lang="ro-RO"/>
           </a:p>
@@ -4517,7 +4517,7 @@
           <a:p>
             <a:fld id="{1EC6663A-CE1B-480C-ABFA-A1C2E4D1AD37}" type="datetimeFigureOut">
               <a:rPr lang="ro-RO" smtClean="0"/>
-              <a:t>05.12.2017</a:t>
+              <a:t>06.12.2017</a:t>
             </a:fld>
             <a:endParaRPr lang="ro-RO"/>
           </a:p>
@@ -4800,7 +4800,7 @@
           <a:p>
             <a:fld id="{1EC6663A-CE1B-480C-ABFA-A1C2E4D1AD37}" type="datetimeFigureOut">
               <a:rPr lang="ro-RO" smtClean="0"/>
-              <a:t>05.12.2017</a:t>
+              <a:t>06.12.2017</a:t>
             </a:fld>
             <a:endParaRPr lang="ro-RO"/>
           </a:p>
@@ -5091,7 +5091,7 @@
           <a:p>
             <a:fld id="{1EC6663A-CE1B-480C-ABFA-A1C2E4D1AD37}" type="datetimeFigureOut">
               <a:rPr lang="ro-RO" smtClean="0"/>
-              <a:t>05.12.2017</a:t>
+              <a:t>06.12.2017</a:t>
             </a:fld>
             <a:endParaRPr lang="ro-RO"/>
           </a:p>
@@ -5621,7 +5621,7 @@
           <a:p>
             <a:fld id="{1EC6663A-CE1B-480C-ABFA-A1C2E4D1AD37}" type="datetimeFigureOut">
               <a:rPr lang="ro-RO" smtClean="0"/>
-              <a:t>05.12.2017</a:t>
+              <a:t>06.12.2017</a:t>
             </a:fld>
             <a:endParaRPr lang="ro-RO"/>
           </a:p>
@@ -6180,7 +6180,24 @@
               </a:rPr>
               <a:t>Dava</a:t>
             </a:r>
-            <a:endParaRPr lang="ro-RO" sz="9600" dirty="0">
+            <a:r>
+              <a:rPr lang="en-US" sz="9600" dirty="0" smtClean="0">
+                <a:latin typeface="Lucida Console" panose="020B0609040504020204" pitchFamily="49" charset="0"/>
+              </a:rPr>
+              <a:t/>
+            </a:r>
+            <a:br>
+              <a:rPr lang="en-US" sz="9600" dirty="0" smtClean="0">
+                <a:latin typeface="Lucida Console" panose="020B0609040504020204" pitchFamily="49" charset="0"/>
+              </a:rPr>
+            </a:br>
+            <a:r>
+              <a:rPr lang="en-US" sz="3600" dirty="0" smtClean="0">
+                <a:latin typeface="Lucida Console" panose="020B0609040504020204" pitchFamily="49" charset="0"/>
+              </a:rPr>
+              <a:t>Week 2</a:t>
+            </a:r>
+            <a:endParaRPr lang="ro-RO" sz="3600" dirty="0">
               <a:latin typeface="Lucida Console" panose="020B0609040504020204" pitchFamily="49" charset="0"/>
             </a:endParaRPr>
           </a:p>
@@ -6272,6 +6289,13 @@
   <p:clrMapOvr>
     <a:masterClrMapping/>
   </p:clrMapOvr>
+  <p:timing>
+    <p:tnLst>
+      <p:par>
+        <p:cTn id="1" dur="indefinite" restart="never" nodeType="tmRoot"/>
+      </p:par>
+    </p:tnLst>
+  </p:timing>
 </p:sld>
 </file>
 
@@ -6385,6 +6409,13 @@
   <p:clrMapOvr>
     <a:masterClrMapping/>
   </p:clrMapOvr>
+  <p:timing>
+    <p:tnLst>
+      <p:par>
+        <p:cTn id="1" dur="indefinite" restart="never" nodeType="tmRoot"/>
+      </p:par>
+    </p:tnLst>
+  </p:timing>
 </p:sld>
 </file>
 
@@ -6445,7 +6476,7 @@
         </p:nvSpPr>
         <p:spPr>
           <a:xfrm>
-            <a:off x="1484309" y="2553788"/>
+            <a:off x="1606229" y="2266405"/>
             <a:ext cx="10018713" cy="3124201"/>
           </a:xfrm>
         </p:spPr>
@@ -6483,6 +6514,13 @@
   <p:clrMapOvr>
     <a:masterClrMapping/>
   </p:clrMapOvr>
+  <p:timing>
+    <p:tnLst>
+      <p:par>
+        <p:cTn id="1" dur="indefinite" restart="never" nodeType="tmRoot"/>
+      </p:par>
+    </p:tnLst>
+  </p:timing>
 </p:sld>
 </file>
 
@@ -6579,7 +6617,11 @@
           <a:p>
             <a:r>
               <a:rPr lang="en-US" dirty="0" smtClean="0"/>
-              <a:t>Project skeleton</a:t>
+              <a:t>Project </a:t>
+            </a:r>
+            <a:r>
+              <a:rPr lang="en-US" dirty="0" smtClean="0"/>
+              <a:t>base ideas</a:t>
             </a:r>
             <a:endParaRPr lang="ro-RO" dirty="0"/>
           </a:p>
@@ -6595,6 +6637,13 @@
   <p:clrMapOvr>
     <a:masterClrMapping/>
   </p:clrMapOvr>
+  <p:timing>
+    <p:tnLst>
+      <p:par>
+        <p:cTn id="1" dur="indefinite" restart="never" nodeType="tmRoot"/>
+      </p:par>
+    </p:tnLst>
+  </p:timing>
 </p:sld>
 </file>
 
@@ -6660,8 +6709,9 @@
           <a:p>
             <a:r>
               <a:rPr lang="en-US" dirty="0" smtClean="0"/>
-              <a:t>UML Diagrams</a:t>
-            </a:r>
+              <a:t>UML Diagrams, Project Architecture</a:t>
+            </a:r>
+            <a:endParaRPr lang="en-US" dirty="0" smtClean="0"/>
           </a:p>
           <a:p>
             <a:r>
@@ -6682,6 +6732,13 @@
   <p:clrMapOvr>
     <a:masterClrMapping/>
   </p:clrMapOvr>
+  <p:timing>
+    <p:tnLst>
+      <p:par>
+        <p:cTn id="1" dur="indefinite" restart="never" nodeType="tmRoot"/>
+      </p:par>
+    </p:tnLst>
+  </p:timing>
 </p:sld>
 </file>
 

</xml_diff>